<commit_message>
updating course read me with code
</commit_message>
<xml_diff>
--- a/slides/11_dimensionality_reduction_and_clustering.pptx
+++ b/slides/11_dimensionality_reduction_and_clustering.pptx
@@ -12312,7 +12312,21 @@
                 <a:latin typeface=""/>
                 <a:cs typeface=""/>
               </a:rPr>
-              <a:t>However, as  you must chose an arbitrary cutoff point to split your data, you may get highly unbalanced clusters or markedly different numbers of clusters as the data changes through time. </a:t>
+              <a:t>However, as </a:t>
+            </a:r>
+            <a:r>
+              <a:rPr lang="en-US" sz="1800" dirty="0" smtClean="0">
+                <a:latin typeface=""/>
+                <a:cs typeface=""/>
+              </a:rPr>
+              <a:t>you </a:t>
+            </a:r>
+            <a:r>
+              <a:rPr lang="en-US" sz="1800" dirty="0" smtClean="0">
+                <a:latin typeface=""/>
+                <a:cs typeface=""/>
+              </a:rPr>
+              <a:t>must chose an arbitrary cutoff point to split your data, you may get highly unbalanced clusters or markedly different numbers of clusters as the data changes through time. </a:t>
             </a:r>
           </a:p>
           <a:p>
@@ -12783,14 +12797,7 @@
                 <a:latin typeface=""/>
                 <a:cs typeface=""/>
               </a:rPr>
-              <a:t>Plot the results </a:t>
-            </a:r>
-            <a:r>
-              <a:rPr lang="en-US" sz="1800" smtClean="0">
-                <a:latin typeface=""/>
-                <a:cs typeface=""/>
-              </a:rPr>
-              <a:t>and compare to K-means and DBSCAN.</a:t>
+              <a:t>Plot the results and compare to K-means and DBSCAN.</a:t>
             </a:r>
             <a:endParaRPr lang="en-US" sz="1800" dirty="0" smtClean="0">
               <a:latin typeface=""/>
@@ -13356,7 +13363,15 @@
             </a:pPr>
             <a:r>
               <a:rPr lang="en-US" dirty="0" smtClean="0"/>
-              <a:t>PRINCIPAL COMPONENTS ANALYSIS</a:t>
+              <a:t>PRINCIPAL </a:t>
+            </a:r>
+            <a:r>
+              <a:rPr lang="en-US" dirty="0" smtClean="0"/>
+              <a:t>COMPONENT </a:t>
+            </a:r>
+            <a:r>
+              <a:rPr lang="en-US" dirty="0" smtClean="0"/>
+              <a:t>ANALYSIS</a:t>
             </a:r>
           </a:p>
         </p:txBody>
@@ -13450,7 +13465,14 @@
                 <a:latin typeface=""/>
                 <a:cs typeface=""/>
               </a:rPr>
-              <a:t> Recall that in previous classes, you learned feature selection, i.e. a recursive process to determine the bag of variables that allow your model to optimize predictive accuracy.</a:t>
+              <a:t>Recall </a:t>
+            </a:r>
+            <a:r>
+              <a:rPr lang="en-US" sz="1800" dirty="0" smtClean="0">
+                <a:latin typeface=""/>
+                <a:cs typeface=""/>
+              </a:rPr>
+              <a:t>that in previous classes, you learned feature selection, i.e. a recursive process to determine the bag of variables that allow your model to optimize predictive accuracy.</a:t>
             </a:r>
           </a:p>
           <a:p>
@@ -13923,7 +13945,15 @@
             </a:pPr>
             <a:r>
               <a:rPr lang="en-US" dirty="0" smtClean="0"/>
-              <a:t>PRINCIPAL COMPONENTS ANALYSIS</a:t>
+              <a:t>PRINCIPAL </a:t>
+            </a:r>
+            <a:r>
+              <a:rPr lang="en-US" dirty="0" smtClean="0"/>
+              <a:t>COMPONENT </a:t>
+            </a:r>
+            <a:r>
+              <a:rPr lang="en-US" dirty="0" smtClean="0"/>
+              <a:t>ANALYSIS</a:t>
             </a:r>
           </a:p>
         </p:txBody>
@@ -14484,7 +14514,21 @@
                 <a:latin typeface=""/>
                 <a:cs typeface=""/>
               </a:rPr>
-              <a:t>To get around these issues, data scientists often use principal component analysis to ‘decompose’ the data into n (typically 3 or fewer) dimensions. </a:t>
+              <a:t>To get around these issues, data scientists often use principal component analysis to ‘decompose’ the data into </a:t>
+            </a:r>
+            <a:r>
+              <a:rPr lang="en-US" sz="1800" dirty="0" smtClean="0">
+                <a:latin typeface=""/>
+                <a:cs typeface=""/>
+              </a:rPr>
+              <a:t>n </a:t>
+            </a:r>
+            <a:r>
+              <a:rPr lang="en-US" sz="1800" dirty="0" smtClean="0">
+                <a:latin typeface=""/>
+                <a:cs typeface=""/>
+              </a:rPr>
+              <a:t>dimensions. </a:t>
             </a:r>
           </a:p>
           <a:p>
@@ -18757,7 +18801,21 @@
                 <a:latin typeface=""/>
                 <a:cs typeface=""/>
               </a:rPr>
-              <a:t>Support Vector Machines (SVMs) as a set of classifiers that use similar techniques to PCA and other matrix-based dimensionality reduction techniques. </a:t>
+              <a:t>Support Vector Machines (SVMs) </a:t>
+            </a:r>
+            <a:r>
+              <a:rPr lang="en-US" sz="1800" dirty="0" smtClean="0">
+                <a:latin typeface=""/>
+                <a:cs typeface=""/>
+              </a:rPr>
+              <a:t>are </a:t>
+            </a:r>
+            <a:r>
+              <a:rPr lang="en-US" sz="1800" dirty="0" smtClean="0">
+                <a:latin typeface=""/>
+                <a:cs typeface=""/>
+              </a:rPr>
+              <a:t>a set of classifiers that use similar techniques to PCA and other matrix-based dimensionality reduction techniques. </a:t>
             </a:r>
           </a:p>
           <a:p>
@@ -21867,14 +21925,21 @@
                 <a:latin typeface=""/>
                 <a:cs typeface=""/>
               </a:rPr>
-              <a:t>k</a:t>
+              <a:t>K</a:t>
             </a:r>
             <a:r>
               <a:rPr lang="en-US" sz="1800" b="1" dirty="0" smtClean="0">
                 <a:latin typeface=""/>
                 <a:cs typeface=""/>
               </a:rPr>
-              <a:t>-Means </a:t>
+              <a:t>-</a:t>
+            </a:r>
+            <a:r>
+              <a:rPr lang="en-US" sz="1800" b="1" dirty="0" smtClean="0">
+                <a:latin typeface=""/>
+                <a:cs typeface=""/>
+              </a:rPr>
+              <a:t>Means </a:t>
             </a:r>
             <a:r>
               <a:rPr lang="en-US" sz="1800" dirty="0" smtClean="0">

</xml_diff>